<commit_message>
Updated sml-client applications in dependencies
</commit_message>
<xml_diff>
--- a/docs/v2.3.0/ICT-Transport-Silicone_Java_ProjectDependencies-230.pptx
+++ b/docs/v2.3.0/ICT-Transport-Silicone_Java_ProjectDependencies-230.pptx
@@ -195,7 +195,7 @@
             <a:fld id="{088C8A11-EB0A-48FD-92A0-DF3091336A59}" type="datetimeFigureOut">
               <a:rPr lang="en-GB" smtClean="0"/>
               <a:pPr/>
-              <a:t>30/03/2012</a:t>
+              <a:t>06/04/2012</a:t>
             </a:fld>
             <a:endParaRPr lang="en-GB"/>
           </a:p>
@@ -366,7 +366,7 @@
     </p:spTree>
     <p:extLst>
       <p:ext uri="{BB962C8B-B14F-4D97-AF65-F5344CB8AC3E}">
-        <p14:creationId xmlns="" xmlns:p14="http://schemas.microsoft.com/office/powerpoint/2010/main" val="2347062740"/>
+        <p14:creationId xmlns:p14="http://schemas.microsoft.com/office/powerpoint/2010/main" xmlns="" val="2347062740"/>
       </p:ext>
     </p:extLst>
   </p:cSld>
@@ -812,7 +812,7 @@
             <a:fld id="{2943B846-A01C-46EC-8AC6-C34985E1F147}" type="datetime1">
               <a:rPr lang="de-AT" smtClean="0"/>
               <a:pPr/>
-              <a:t>30.03.2012</a:t>
+              <a:t>06.04.2012</a:t>
             </a:fld>
             <a:endParaRPr lang="de-AT"/>
           </a:p>
@@ -979,7 +979,7 @@
             <a:fld id="{64584377-67F1-4445-89AB-0F3B7CC8E5FA}" type="datetime1">
               <a:rPr lang="de-AT" smtClean="0"/>
               <a:pPr/>
-              <a:t>30.03.2012</a:t>
+              <a:t>06.04.2012</a:t>
             </a:fld>
             <a:endParaRPr lang="de-AT"/>
           </a:p>
@@ -1156,7 +1156,7 @@
             <a:fld id="{68516438-451A-4676-91C7-7C955F69BD50}" type="datetime1">
               <a:rPr lang="de-AT" smtClean="0"/>
               <a:pPr/>
-              <a:t>30.03.2012</a:t>
+              <a:t>06.04.2012</a:t>
             </a:fld>
             <a:endParaRPr lang="de-AT"/>
           </a:p>
@@ -1323,7 +1323,7 @@
             <a:fld id="{7C74F28F-B9B7-4CA1-8E74-4FCCB67A3728}" type="datetime1">
               <a:rPr lang="de-AT" smtClean="0"/>
               <a:pPr/>
-              <a:t>30.03.2012</a:t>
+              <a:t>06.04.2012</a:t>
             </a:fld>
             <a:endParaRPr lang="de-AT"/>
           </a:p>
@@ -1566,7 +1566,7 @@
             <a:fld id="{F7B98E26-33EA-476B-A7F4-78BCBDB1F9DF}" type="datetime1">
               <a:rPr lang="de-AT" smtClean="0"/>
               <a:pPr/>
-              <a:t>30.03.2012</a:t>
+              <a:t>06.04.2012</a:t>
             </a:fld>
             <a:endParaRPr lang="de-AT"/>
           </a:p>
@@ -1851,7 +1851,7 @@
             <a:fld id="{17E15FCA-C1C5-4B6F-8E6B-C765FCBCEDE7}" type="datetime1">
               <a:rPr lang="de-AT" smtClean="0"/>
               <a:pPr/>
-              <a:t>30.03.2012</a:t>
+              <a:t>06.04.2012</a:t>
             </a:fld>
             <a:endParaRPr lang="de-AT"/>
           </a:p>
@@ -2270,7 +2270,7 @@
             <a:fld id="{3FC30DF9-67D6-4DCD-952D-517CFD9234A1}" type="datetime1">
               <a:rPr lang="de-AT" smtClean="0"/>
               <a:pPr/>
-              <a:t>30.03.2012</a:t>
+              <a:t>06.04.2012</a:t>
             </a:fld>
             <a:endParaRPr lang="de-AT"/>
           </a:p>
@@ -2385,7 +2385,7 @@
             <a:fld id="{37545D1E-AD59-4781-9575-A1389292FAC4}" type="datetime1">
               <a:rPr lang="de-AT" smtClean="0"/>
               <a:pPr/>
-              <a:t>30.03.2012</a:t>
+              <a:t>06.04.2012</a:t>
             </a:fld>
             <a:endParaRPr lang="de-AT"/>
           </a:p>
@@ -2477,7 +2477,7 @@
             <a:fld id="{44A36951-5496-4E3B-A01F-53A9ACCD758B}" type="datetime1">
               <a:rPr lang="de-AT" smtClean="0"/>
               <a:pPr/>
-              <a:t>30.03.2012</a:t>
+              <a:t>06.04.2012</a:t>
             </a:fld>
             <a:endParaRPr lang="de-AT"/>
           </a:p>
@@ -2751,7 +2751,7 @@
             <a:fld id="{CAC1171A-F559-4EBA-A918-D02527D76FE2}" type="datetime1">
               <a:rPr lang="de-AT" smtClean="0"/>
               <a:pPr/>
-              <a:t>30.03.2012</a:t>
+              <a:t>06.04.2012</a:t>
             </a:fld>
             <a:endParaRPr lang="de-AT"/>
           </a:p>
@@ -3001,7 +3001,7 @@
             <a:fld id="{12C68ADA-1EEA-480A-9CD1-8E41C4EF7AEC}" type="datetime1">
               <a:rPr lang="de-AT" smtClean="0"/>
               <a:pPr/>
-              <a:t>30.03.2012</a:t>
+              <a:t>06.04.2012</a:t>
             </a:fld>
             <a:endParaRPr lang="de-AT"/>
           </a:p>
@@ -3211,7 +3211,7 @@
             <a:fld id="{82FD0C75-38EC-4741-8E42-89A6EA3BCDBC}" type="datetime1">
               <a:rPr lang="de-AT" smtClean="0"/>
               <a:pPr/>
-              <a:t>30.03.2012</a:t>
+              <a:t>06.04.2012</a:t>
             </a:fld>
             <a:endParaRPr lang="de-AT"/>
           </a:p>
@@ -3665,7 +3665,11 @@
           <a:p>
             <a:r>
               <a:rPr lang="de-AT" dirty="0" smtClean="0"/>
-              <a:t>Date: 2012-03-29</a:t>
+              <a:t>Date: </a:t>
+            </a:r>
+            <a:r>
+              <a:rPr lang="de-AT" dirty="0" smtClean="0"/>
+              <a:t>2012-04-06</a:t>
             </a:r>
             <a:endParaRPr lang="de-AT" dirty="0"/>
           </a:p>
@@ -3689,7 +3693,7 @@
             <a:fld id="{5C3FF81A-864E-415D-AB7A-121B57111D20}" type="datetime1">
               <a:rPr lang="de-AT" smtClean="0"/>
               <a:pPr/>
-              <a:t>30.03.2012</a:t>
+              <a:t>06.04.2012</a:t>
             </a:fld>
             <a:endParaRPr lang="de-AT"/>
           </a:p>
@@ -4046,8 +4050,8 @@
         </p:nvSpPr>
         <p:spPr>
           <a:xfrm>
-            <a:off x="6228184" y="3140968"/>
-            <a:ext cx="1224136" cy="360040"/>
+            <a:off x="6444208" y="3140968"/>
+            <a:ext cx="1152128" cy="360040"/>
           </a:xfrm>
           <a:prstGeom prst="rect">
             <a:avLst/>
@@ -4088,7 +4092,7 @@
         </p:nvSpPr>
         <p:spPr>
           <a:xfrm>
-            <a:off x="2843808" y="3933056"/>
+            <a:off x="2267744" y="3933056"/>
             <a:ext cx="1008112" cy="360040"/>
           </a:xfrm>
           <a:prstGeom prst="rect">
@@ -4115,10 +4119,14 @@
           <a:p>
             <a:pPr algn="ctr"/>
             <a:r>
-              <a:rPr lang="en-GB" sz="1400" smtClean="0"/>
-              <a:t>sml-client-apps</a:t>
-            </a:r>
-            <a:endParaRPr lang="en-GB" sz="1400"/>
+              <a:rPr lang="en-GB" sz="1400" dirty="0" err="1" smtClean="0"/>
+              <a:t>sml</a:t>
+            </a:r>
+            <a:r>
+              <a:rPr lang="en-GB" sz="1400" dirty="0" smtClean="0"/>
+              <a:t>-client-console</a:t>
+            </a:r>
+            <a:endParaRPr lang="en-GB" sz="1400" dirty="0"/>
           </a:p>
         </p:txBody>
       </p:sp>
@@ -4132,9 +4140,9 @@
           <p:nvPr/>
         </p:nvCxnSpPr>
         <p:spPr>
-          <a:xfrm>
-            <a:off x="3275856" y="3501008"/>
-            <a:ext cx="72008" cy="432048"/>
+          <a:xfrm flipH="1">
+            <a:off x="2771800" y="3501008"/>
+            <a:ext cx="504056" cy="432048"/>
           </a:xfrm>
           <a:prstGeom prst="straightConnector1">
             <a:avLst/>
@@ -4170,7 +4178,7 @@
         <p:spPr>
           <a:xfrm>
             <a:off x="4535996" y="2636912"/>
-            <a:ext cx="2304256" cy="504056"/>
+            <a:ext cx="2484276" cy="504056"/>
           </a:xfrm>
           <a:prstGeom prst="straightConnector1">
             <a:avLst/>
@@ -4202,7 +4210,7 @@
         </p:nvSpPr>
         <p:spPr>
           <a:xfrm>
-            <a:off x="539552" y="3140968"/>
+            <a:off x="179512" y="3140968"/>
             <a:ext cx="1512168" cy="360040"/>
           </a:xfrm>
           <a:prstGeom prst="rect">
@@ -4247,8 +4255,8 @@
         </p:nvCxnSpPr>
         <p:spPr>
           <a:xfrm flipH="1">
-            <a:off x="1295636" y="2636912"/>
-            <a:ext cx="3240360" cy="504056"/>
+            <a:off x="935596" y="2636912"/>
+            <a:ext cx="3600400" cy="504056"/>
           </a:xfrm>
           <a:prstGeom prst="straightConnector1">
             <a:avLst/>
@@ -4283,8 +4291,8 @@
         </p:nvCxnSpPr>
         <p:spPr>
           <a:xfrm flipH="1">
-            <a:off x="1295636" y="2060848"/>
-            <a:ext cx="612068" cy="1080120"/>
+            <a:off x="935596" y="2060848"/>
+            <a:ext cx="972108" cy="1080120"/>
           </a:xfrm>
           <a:prstGeom prst="straightConnector1">
             <a:avLst/>
@@ -4316,8 +4324,8 @@
         </p:nvSpPr>
         <p:spPr>
           <a:xfrm>
-            <a:off x="3923928" y="3933056"/>
-            <a:ext cx="1080120" cy="360040"/>
+            <a:off x="4355976" y="3933056"/>
+            <a:ext cx="1008112" cy="360040"/>
           </a:xfrm>
           <a:prstGeom prst="rect">
             <a:avLst/>
@@ -4344,9 +4352,13 @@
             <a:pPr algn="ctr"/>
             <a:r>
               <a:rPr lang="en-GB" sz="1400" smtClean="0"/>
-              <a:t>smp-client-console</a:t>
-            </a:r>
-            <a:endParaRPr lang="en-GB" sz="1400"/>
+              <a:t>smp</a:t>
+            </a:r>
+            <a:r>
+              <a:rPr lang="en-GB" sz="1400" dirty="0" smtClean="0"/>
+              <a:t>-client-console</a:t>
+            </a:r>
+            <a:endParaRPr lang="en-GB" sz="1400" dirty="0"/>
           </a:p>
         </p:txBody>
       </p:sp>
@@ -4361,8 +4373,8 @@
         </p:nvCxnSpPr>
         <p:spPr>
           <a:xfrm flipH="1">
-            <a:off x="4463988" y="3501008"/>
-            <a:ext cx="720080" cy="432048"/>
+            <a:off x="4860032" y="3501008"/>
+            <a:ext cx="324036" cy="432048"/>
           </a:xfrm>
           <a:prstGeom prst="straightConnector1">
             <a:avLst/>
@@ -4394,8 +4406,8 @@
         </p:nvSpPr>
         <p:spPr>
           <a:xfrm>
-            <a:off x="7668344" y="3933056"/>
-            <a:ext cx="1187624" cy="360040"/>
+            <a:off x="7812360" y="3933056"/>
+            <a:ext cx="1152128" cy="360040"/>
           </a:xfrm>
           <a:prstGeom prst="rect">
             <a:avLst/>
@@ -4439,8 +4451,8 @@
         </p:nvCxnSpPr>
         <p:spPr>
           <a:xfrm>
-            <a:off x="6840252" y="3501008"/>
-            <a:ext cx="1421904" cy="432048"/>
+            <a:off x="7020272" y="3501008"/>
+            <a:ext cx="1368152" cy="432048"/>
           </a:xfrm>
           <a:prstGeom prst="straightConnector1">
             <a:avLst/>
@@ -4472,7 +4484,7 @@
         </p:nvSpPr>
         <p:spPr>
           <a:xfrm>
-            <a:off x="6228184" y="3933056"/>
+            <a:off x="6444208" y="3933056"/>
             <a:ext cx="1368152" cy="360040"/>
           </a:xfrm>
           <a:prstGeom prst="rect">
@@ -4499,10 +4511,14 @@
           <a:p>
             <a:pPr algn="ctr"/>
             <a:r>
-              <a:rPr lang="en-GB" sz="1400" smtClean="0"/>
-              <a:t>transport-start-filereceiver</a:t>
-            </a:r>
-            <a:endParaRPr lang="en-GB" sz="1400"/>
+              <a:rPr lang="en-GB" sz="1400" dirty="0" smtClean="0"/>
+              <a:t>transport-start-</a:t>
+            </a:r>
+            <a:r>
+              <a:rPr lang="en-GB" sz="1400" dirty="0" err="1" smtClean="0"/>
+              <a:t>filereceiver</a:t>
+            </a:r>
+            <a:endParaRPr lang="en-GB" sz="1400" dirty="0"/>
           </a:p>
         </p:txBody>
       </p:sp>
@@ -4517,8 +4533,8 @@
         </p:nvCxnSpPr>
         <p:spPr>
           <a:xfrm>
-            <a:off x="6840252" y="3501008"/>
-            <a:ext cx="72008" cy="432048"/>
+            <a:off x="7020272" y="3501008"/>
+            <a:ext cx="108012" cy="432048"/>
           </a:xfrm>
           <a:prstGeom prst="straightConnector1">
             <a:avLst/>
@@ -4550,7 +4566,7 @@
         </p:nvSpPr>
         <p:spPr>
           <a:xfrm>
-            <a:off x="467544" y="4581128"/>
+            <a:off x="107504" y="4581128"/>
             <a:ext cx="792088" cy="360040"/>
           </a:xfrm>
           <a:prstGeom prst="rect">
@@ -4577,10 +4593,10 @@
           <a:p>
             <a:pPr algn="ctr"/>
             <a:r>
-              <a:rPr lang="en-GB" sz="1400" smtClean="0"/>
+              <a:rPr lang="en-GB" sz="1400" dirty="0" err="1" smtClean="0"/>
               <a:t>sml-webapp</a:t>
             </a:r>
-            <a:endParaRPr lang="en-GB" sz="1400"/>
+            <a:endParaRPr lang="en-GB" sz="1400" dirty="0"/>
           </a:p>
         </p:txBody>
       </p:sp>
@@ -4595,7 +4611,7 @@
         </p:nvCxnSpPr>
         <p:spPr>
           <a:xfrm flipH="1">
-            <a:off x="863588" y="3501008"/>
+            <a:off x="503548" y="3501008"/>
             <a:ext cx="432048" cy="1080120"/>
           </a:xfrm>
           <a:prstGeom prst="straightConnector1">
@@ -4628,8 +4644,8 @@
         </p:nvSpPr>
         <p:spPr>
           <a:xfrm>
-            <a:off x="1331640" y="4581128"/>
-            <a:ext cx="1224136" cy="360040"/>
+            <a:off x="971600" y="4581128"/>
+            <a:ext cx="1152128" cy="360040"/>
           </a:xfrm>
           <a:prstGeom prst="rect">
             <a:avLst/>
@@ -4673,8 +4689,8 @@
         </p:nvCxnSpPr>
         <p:spPr>
           <a:xfrm>
-            <a:off x="1295636" y="3501008"/>
-            <a:ext cx="648072" cy="1080120"/>
+            <a:off x="935596" y="3501008"/>
+            <a:ext cx="612068" cy="1080120"/>
           </a:xfrm>
           <a:prstGeom prst="straightConnector1">
             <a:avLst/>
@@ -4706,7 +4722,7 @@
         </p:nvSpPr>
         <p:spPr>
           <a:xfrm>
-            <a:off x="1979712" y="3933056"/>
+            <a:off x="1475656" y="3933056"/>
             <a:ext cx="792088" cy="360040"/>
           </a:xfrm>
           <a:prstGeom prst="rect">
@@ -4751,8 +4767,8 @@
         </p:nvCxnSpPr>
         <p:spPr>
           <a:xfrm flipH="1">
-            <a:off x="2375756" y="3501008"/>
-            <a:ext cx="900100" cy="432048"/>
+            <a:off x="1871700" y="3501008"/>
+            <a:ext cx="1404156" cy="432048"/>
           </a:xfrm>
           <a:prstGeom prst="straightConnector1">
             <a:avLst/>
@@ -4786,9 +4802,9 @@
           <p:nvPr/>
         </p:nvCxnSpPr>
         <p:spPr>
-          <a:xfrm>
-            <a:off x="1907704" y="2060848"/>
-            <a:ext cx="468052" cy="1872208"/>
+          <a:xfrm flipH="1">
+            <a:off x="1871700" y="2060848"/>
+            <a:ext cx="36004" cy="1872208"/>
           </a:xfrm>
           <a:prstGeom prst="straightConnector1">
             <a:avLst/>
@@ -4820,7 +4836,7 @@
         </p:nvSpPr>
         <p:spPr>
           <a:xfrm>
-            <a:off x="5076056" y="3933056"/>
+            <a:off x="5364088" y="3933056"/>
             <a:ext cx="1080120" cy="360040"/>
           </a:xfrm>
           <a:prstGeom prst="rect">
@@ -4866,7 +4882,7 @@
         <p:spPr>
           <a:xfrm>
             <a:off x="5184068" y="3501008"/>
-            <a:ext cx="432048" cy="432048"/>
+            <a:ext cx="720080" cy="432048"/>
           </a:xfrm>
           <a:prstGeom prst="straightConnector1">
             <a:avLst/>
@@ -4901,8 +4917,8 @@
         </p:nvCxnSpPr>
         <p:spPr>
           <a:xfrm flipH="1">
-            <a:off x="5616116" y="3501008"/>
-            <a:ext cx="1224136" cy="432048"/>
+            <a:off x="5904148" y="3501008"/>
+            <a:ext cx="1116124" cy="432048"/>
           </a:xfrm>
           <a:prstGeom prst="straightConnector1">
             <a:avLst/>
@@ -4979,8 +4995,8 @@
         </p:nvCxnSpPr>
         <p:spPr>
           <a:xfrm>
-            <a:off x="5616116" y="4293096"/>
-            <a:ext cx="1728192" cy="576064"/>
+            <a:off x="5904148" y="4293096"/>
+            <a:ext cx="1440160" cy="576064"/>
           </a:xfrm>
           <a:prstGeom prst="straightConnector1">
             <a:avLst/>
@@ -5016,7 +5032,7 @@
         <p:spPr>
           <a:xfrm flipH="1">
             <a:off x="7344308" y="4293096"/>
-            <a:ext cx="917848" cy="576064"/>
+            <a:ext cx="1044116" cy="576064"/>
           </a:xfrm>
           <a:prstGeom prst="straightConnector1">
             <a:avLst/>
@@ -5116,8 +5132,8 @@
         </p:nvCxnSpPr>
         <p:spPr>
           <a:xfrm>
-            <a:off x="5616116" y="4293096"/>
-            <a:ext cx="396044" cy="576064"/>
+            <a:off x="5904148" y="4293096"/>
+            <a:ext cx="108012" cy="576064"/>
           </a:xfrm>
           <a:prstGeom prst="straightConnector1">
             <a:avLst/>
@@ -5153,7 +5169,7 @@
         <p:spPr>
           <a:xfrm flipH="1">
             <a:off x="6012160" y="4293096"/>
-            <a:ext cx="900100" cy="576064"/>
+            <a:ext cx="1116124" cy="576064"/>
           </a:xfrm>
           <a:prstGeom prst="straightConnector1">
             <a:avLst/>
@@ -5342,6 +5358,88 @@
           </a:p>
         </p:txBody>
       </p:sp>
+      <p:sp>
+        <p:nvSpPr>
+          <p:cNvPr id="69" name="Rechteck 68"/>
+          <p:cNvSpPr/>
+          <p:nvPr/>
+        </p:nvSpPr>
+        <p:spPr>
+          <a:xfrm>
+            <a:off x="3275856" y="3933056"/>
+            <a:ext cx="1008112" cy="360040"/>
+          </a:xfrm>
+          <a:prstGeom prst="rect">
+            <a:avLst/>
+          </a:prstGeom>
+        </p:spPr>
+        <p:style>
+          <a:lnRef idx="1">
+            <a:schemeClr val="accent6"/>
+          </a:lnRef>
+          <a:fillRef idx="2">
+            <a:schemeClr val="accent6"/>
+          </a:fillRef>
+          <a:effectRef idx="1">
+            <a:schemeClr val="accent6"/>
+          </a:effectRef>
+          <a:fontRef idx="minor">
+            <a:schemeClr val="dk1"/>
+          </a:fontRef>
+        </p:style>
+        <p:txBody>
+          <a:bodyPr rtlCol="0" anchor="ctr"/>
+          <a:lstStyle/>
+          <a:p>
+            <a:pPr algn="ctr"/>
+            <a:r>
+              <a:rPr lang="en-GB" sz="1400" dirty="0" err="1" smtClean="0"/>
+              <a:t>sml</a:t>
+            </a:r>
+            <a:r>
+              <a:rPr lang="en-GB" sz="1400" dirty="0" smtClean="0"/>
+              <a:t>-client-swing</a:t>
+            </a:r>
+            <a:endParaRPr lang="en-GB" sz="1400" dirty="0"/>
+          </a:p>
+        </p:txBody>
+      </p:sp>
+      <p:cxnSp>
+        <p:nvCxnSpPr>
+          <p:cNvPr id="70" name="Gerade Verbindung mit Pfeil 69"/>
+          <p:cNvCxnSpPr>
+            <a:stCxn id="111" idx="2"/>
+            <a:endCxn id="69" idx="0"/>
+          </p:cNvCxnSpPr>
+          <p:nvPr/>
+        </p:nvCxnSpPr>
+        <p:spPr>
+          <a:xfrm>
+            <a:off x="3275856" y="3501008"/>
+            <a:ext cx="504056" cy="432048"/>
+          </a:xfrm>
+          <a:prstGeom prst="straightConnector1">
+            <a:avLst/>
+          </a:prstGeom>
+          <a:ln>
+            <a:tailEnd type="arrow"/>
+          </a:ln>
+        </p:spPr>
+        <p:style>
+          <a:lnRef idx="1">
+            <a:schemeClr val="accent1"/>
+          </a:lnRef>
+          <a:fillRef idx="0">
+            <a:schemeClr val="accent1"/>
+          </a:fillRef>
+          <a:effectRef idx="0">
+            <a:schemeClr val="accent1"/>
+          </a:effectRef>
+          <a:fontRef idx="minor">
+            <a:schemeClr val="tx1"/>
+          </a:fontRef>
+        </p:style>
+      </p:cxnSp>
     </p:spTree>
   </p:cSld>
   <p:clrMapOvr>

</xml_diff>

<commit_message>
Updated images for the Wiki
</commit_message>
<xml_diff>
--- a/docs/v2.3.0/ICT-Transport-Silicone_Java_ProjectDependencies-230.pptx
+++ b/docs/v2.3.0/ICT-Transport-Silicone_Java_ProjectDependencies-230.pptx
@@ -366,7 +366,7 @@
     </p:spTree>
     <p:extLst>
       <p:ext uri="{BB962C8B-B14F-4D97-AF65-F5344CB8AC3E}">
-        <p14:creationId xmlns:p14="http://schemas.microsoft.com/office/powerpoint/2010/main" xmlns="" val="2347062740"/>
+        <p14:creationId xmlns="" xmlns:p14="http://schemas.microsoft.com/office/powerpoint/2010/main" val="2347062740"/>
       </p:ext>
     </p:extLst>
   </p:cSld>
@@ -3665,11 +3665,7 @@
           <a:p>
             <a:r>
               <a:rPr lang="de-AT" dirty="0" smtClean="0"/>
-              <a:t>Date: </a:t>
-            </a:r>
-            <a:r>
-              <a:rPr lang="de-AT" dirty="0" smtClean="0"/>
-              <a:t>2012-04-06</a:t>
+              <a:t>Date: 2012-04-06</a:t>
             </a:r>
             <a:endParaRPr lang="de-AT" dirty="0"/>
           </a:p>
@@ -5473,7 +5469,7 @@
         </p:nvSpPr>
         <p:spPr>
           <a:xfrm>
-            <a:off x="1763688" y="2420888"/>
+            <a:off x="467544" y="2852936"/>
             <a:ext cx="1440160" cy="360040"/>
           </a:xfrm>
           <a:prstGeom prst="rect">
@@ -5515,7 +5511,7 @@
         </p:nvSpPr>
         <p:spPr>
           <a:xfrm>
-            <a:off x="4716016" y="2420888"/>
+            <a:off x="3419872" y="2852936"/>
             <a:ext cx="1944216" cy="360040"/>
           </a:xfrm>
           <a:prstGeom prst="rect">
@@ -5557,7 +5553,7 @@
         </p:nvSpPr>
         <p:spPr>
           <a:xfrm>
-            <a:off x="4716016" y="3284984"/>
+            <a:off x="3419872" y="3717032"/>
             <a:ext cx="1944216" cy="360040"/>
           </a:xfrm>
           <a:prstGeom prst="rect">
@@ -5602,7 +5598,7 @@
         </p:nvCxnSpPr>
         <p:spPr>
           <a:xfrm>
-            <a:off x="5688124" y="2780928"/>
+            <a:off x="4391980" y="3212976"/>
             <a:ext cx="0" cy="504056"/>
           </a:xfrm>
           <a:prstGeom prst="straightConnector1">
@@ -5635,7 +5631,7 @@
         </p:nvSpPr>
         <p:spPr>
           <a:xfrm>
-            <a:off x="1907704" y="3284984"/>
+            <a:off x="611560" y="3717032"/>
             <a:ext cx="1152128" cy="360040"/>
           </a:xfrm>
           <a:prstGeom prst="rect">
@@ -5680,7 +5676,7 @@
         </p:nvCxnSpPr>
         <p:spPr>
           <a:xfrm>
-            <a:off x="2483768" y="2780928"/>
+            <a:off x="1187624" y="3212976"/>
             <a:ext cx="0" cy="504056"/>
           </a:xfrm>
           <a:prstGeom prst="straightConnector1">
@@ -5713,7 +5709,7 @@
         </p:nvSpPr>
         <p:spPr>
           <a:xfrm>
-            <a:off x="3203848" y="3284984"/>
+            <a:off x="1907704" y="3717032"/>
             <a:ext cx="1368152" cy="360040"/>
           </a:xfrm>
           <a:prstGeom prst="rect">
@@ -5758,7 +5754,7 @@
         </p:nvCxnSpPr>
         <p:spPr>
           <a:xfrm>
-            <a:off x="2483768" y="2780928"/>
+            <a:off x="1187624" y="3212976"/>
             <a:ext cx="1404156" cy="504056"/>
           </a:xfrm>
           <a:prstGeom prst="straightConnector1">
@@ -5794,7 +5790,7 @@
         </p:nvCxnSpPr>
         <p:spPr>
           <a:xfrm flipH="1">
-            <a:off x="3887924" y="2780928"/>
+            <a:off x="2591780" y="3212976"/>
             <a:ext cx="1800200" cy="504056"/>
           </a:xfrm>
           <a:prstGeom prst="straightConnector1">
@@ -6015,7 +6011,7 @@
         </p:nvSpPr>
         <p:spPr>
           <a:xfrm>
-            <a:off x="3059832" y="4077072"/>
+            <a:off x="1763688" y="4509120"/>
             <a:ext cx="1656184" cy="360040"/>
           </a:xfrm>
           <a:prstGeom prst="rect">
@@ -6064,7 +6060,7 @@
         </p:nvCxnSpPr>
         <p:spPr>
           <a:xfrm>
-            <a:off x="3887924" y="3645024"/>
+            <a:off x="2591780" y="4077072"/>
             <a:ext cx="0" cy="432048"/>
           </a:xfrm>
           <a:prstGeom prst="straightConnector1">

</xml_diff>